<commit_message>
added reset_demo and env docs
</commit_message>
<xml_diff>
--- a/DevopsDemo.pptx
+++ b/DevopsDemo.pptx
@@ -12,8 +12,8 @@
   </p:handoutMasterIdLst>
   <p:sldIdLst>
     <p:sldId id="487" r:id="rId2"/>
-    <p:sldId id="488" r:id="rId3"/>
-    <p:sldId id="492" r:id="rId4"/>
+    <p:sldId id="492" r:id="rId3"/>
+    <p:sldId id="488" r:id="rId4"/>
     <p:sldId id="489" r:id="rId5"/>
     <p:sldId id="490" r:id="rId6"/>
     <p:sldId id="491" r:id="rId7"/>
@@ -25470,15 +25470,8 @@
             <a:pPr lvl="1"/>
             <a:r>
               <a:rPr lang="en-US" dirty="0" smtClean="0"/>
-              <a:t>The demo is hosted as the web site at  </a:t>
+              <a:t>The demo is hosted as the web site </a:t>
             </a:r>
-            <a:r>
-              <a:rPr lang="en-US" dirty="0" smtClean="0">
-                <a:hlinkClick r:id="rId3" action="ppaction://hlinkfile"/>
-              </a:rPr>
-              <a:t>vcadevops.vcloudair.io</a:t>
-            </a:r>
-            <a:endParaRPr lang="en-US" dirty="0" smtClean="0"/>
           </a:p>
           <a:p>
             <a:pPr lvl="1"/>
@@ -25562,7 +25555,7 @@
           <p:nvPr/>
         </p:nvPicPr>
         <p:blipFill>
-          <a:blip r:embed="rId4">
+          <a:blip r:embed="rId3">
             <a:extLst>
               <a:ext uri="{28A0092B-C50C-407E-A947-70E740481C1C}">
                 <a14:useLocalDpi xmlns:a14="http://schemas.microsoft.com/office/drawing/2010/main" val="0"/>
@@ -35507,6 +35500,204 @@
           <a:p>
             <a:r>
               <a:rPr lang="en-US" dirty="0" smtClean="0"/>
+              <a:t>Scenarios</a:t>
+            </a:r>
+            <a:endParaRPr lang="en-US" dirty="0"/>
+          </a:p>
+        </p:txBody>
+      </p:sp>
+      <p:sp>
+        <p:nvSpPr>
+          <p:cNvPr id="3" name="Content Placeholder 2"/>
+          <p:cNvSpPr>
+            <a:spLocks noGrp="1"/>
+          </p:cNvSpPr>
+          <p:nvPr>
+            <p:ph idx="1"/>
+          </p:nvPr>
+        </p:nvSpPr>
+        <p:spPr/>
+        <p:txBody>
+          <a:bodyPr/>
+          <a:lstStyle/>
+          <a:p>
+            <a:r>
+              <a:rPr lang="en-US" dirty="0" smtClean="0"/>
+              <a:t>Current Scenarios</a:t>
+            </a:r>
+          </a:p>
+          <a:p>
+            <a:pPr lvl="1"/>
+            <a:r>
+              <a:rPr lang="en-US" dirty="0"/>
+              <a:t>Create </a:t>
+            </a:r>
+            <a:r>
+              <a:rPr lang="en-US" dirty="0" smtClean="0"/>
+              <a:t>an Ubuntu Server </a:t>
+            </a:r>
+            <a:r>
+              <a:rPr lang="en-US" dirty="0"/>
+              <a:t>on vCloud Air using the Chef vCloud Air Knife </a:t>
+            </a:r>
+            <a:r>
+              <a:rPr lang="en-US" dirty="0" smtClean="0"/>
+              <a:t>plugin.</a:t>
+            </a:r>
+          </a:p>
+          <a:p>
+            <a:pPr lvl="1"/>
+            <a:r>
+              <a:rPr lang="en-US" dirty="0"/>
+              <a:t>Create a Photon Server on vCloud Air using vCloud Air CLI</a:t>
+            </a:r>
+            <a:endParaRPr lang="en-US" dirty="0" smtClean="0"/>
+          </a:p>
+          <a:p>
+            <a:pPr lvl="1"/>
+            <a:r>
+              <a:rPr lang="en-US" dirty="0"/>
+              <a:t>Deploy a D</a:t>
+            </a:r>
+            <a:r>
+              <a:rPr lang="en-US" dirty="0" smtClean="0"/>
+              <a:t>ocker </a:t>
+            </a:r>
+            <a:r>
+              <a:rPr lang="en-US" dirty="0"/>
+              <a:t>container on a Photon </a:t>
+            </a:r>
+            <a:r>
+              <a:rPr lang="en-US" dirty="0" smtClean="0"/>
+              <a:t>Server</a:t>
+            </a:r>
+          </a:p>
+          <a:p>
+            <a:pPr lvl="1"/>
+            <a:r>
+              <a:rPr lang="en-US" dirty="0"/>
+              <a:t>Use chef to configure a Server as a standard Web </a:t>
+            </a:r>
+            <a:r>
+              <a:rPr lang="en-US" dirty="0" smtClean="0"/>
+              <a:t>Server</a:t>
+            </a:r>
+          </a:p>
+          <a:p>
+            <a:pPr lvl="1"/>
+            <a:r>
+              <a:rPr lang="en-US" dirty="0" smtClean="0"/>
+              <a:t>Continuous </a:t>
+            </a:r>
+            <a:r>
+              <a:rPr lang="en-US" dirty="0"/>
+              <a:t>Integration of </a:t>
+            </a:r>
+            <a:r>
+              <a:rPr lang="en-US" dirty="0" smtClean="0"/>
+              <a:t>a Spring Boot </a:t>
+            </a:r>
+            <a:r>
+              <a:rPr lang="en-US" dirty="0"/>
+              <a:t>Project</a:t>
+            </a:r>
+            <a:endParaRPr lang="en-US" dirty="0"/>
+          </a:p>
+        </p:txBody>
+      </p:sp>
+      <p:sp>
+        <p:nvSpPr>
+          <p:cNvPr id="4" name="Footer Placeholder 3"/>
+          <p:cNvSpPr>
+            <a:spLocks noGrp="1"/>
+          </p:cNvSpPr>
+          <p:nvPr>
+            <p:ph type="ftr" sz="quarter" idx="11"/>
+          </p:nvPr>
+        </p:nvSpPr>
+        <p:spPr/>
+        <p:txBody>
+          <a:bodyPr/>
+          <a:lstStyle/>
+          <a:p>
+            <a:r>
+              <a:rPr lang="en-US" dirty="0" smtClean="0"/>
+              <a:t>CONFIDENTIAL</a:t>
+            </a:r>
+            <a:endParaRPr lang="en-US" dirty="0"/>
+          </a:p>
+        </p:txBody>
+      </p:sp>
+      <p:sp>
+        <p:nvSpPr>
+          <p:cNvPr id="5" name="Slide Number Placeholder 4"/>
+          <p:cNvSpPr>
+            <a:spLocks noGrp="1"/>
+          </p:cNvSpPr>
+          <p:nvPr>
+            <p:ph type="sldNum" sz="quarter" idx="12"/>
+          </p:nvPr>
+        </p:nvSpPr>
+        <p:spPr/>
+        <p:txBody>
+          <a:bodyPr/>
+          <a:lstStyle/>
+          <a:p>
+            <a:fld id="{6EA6D8CF-3CDE-4807-BCD2-C9F2B831AAA5}" type="slidenum">
+              <a:rPr lang="en-US" smtClean="0"/>
+              <a:t>2</a:t>
+            </a:fld>
+            <a:endParaRPr lang="en-US" dirty="0"/>
+          </a:p>
+        </p:txBody>
+      </p:sp>
+    </p:spTree>
+    <p:extLst>
+      <p:ext uri="{BB962C8B-B14F-4D97-AF65-F5344CB8AC3E}">
+        <p14:creationId xmlns:p14="http://schemas.microsoft.com/office/powerpoint/2010/main" val="1915387472"/>
+      </p:ext>
+    </p:extLst>
+  </p:cSld>
+  <p:clrMapOvr>
+    <a:masterClrMapping/>
+  </p:clrMapOvr>
+</p:sld>
+</file>
+
+<file path=ppt/slides/slide3.xml><?xml version="1.0" encoding="utf-8"?>
+<p:sld xmlns:a="http://schemas.openxmlformats.org/drawingml/2006/main" xmlns:r="http://schemas.openxmlformats.org/officeDocument/2006/relationships" xmlns:p="http://schemas.openxmlformats.org/presentationml/2006/main">
+  <p:cSld>
+    <p:spTree>
+      <p:nvGrpSpPr>
+        <p:cNvPr id="1" name=""/>
+        <p:cNvGrpSpPr/>
+        <p:nvPr/>
+      </p:nvGrpSpPr>
+      <p:grpSpPr>
+        <a:xfrm>
+          <a:off x="0" y="0"/>
+          <a:ext cx="0" cy="0"/>
+          <a:chOff x="0" y="0"/>
+          <a:chExt cx="0" cy="0"/>
+        </a:xfrm>
+      </p:grpSpPr>
+      <p:sp>
+        <p:nvSpPr>
+          <p:cNvPr id="2" name="Title 1"/>
+          <p:cNvSpPr>
+            <a:spLocks noGrp="1"/>
+          </p:cNvSpPr>
+          <p:nvPr>
+            <p:ph type="title"/>
+          </p:nvPr>
+        </p:nvSpPr>
+        <p:spPr/>
+        <p:txBody>
+          <a:bodyPr/>
+          <a:lstStyle/>
+          <a:p>
+            <a:r>
+              <a:rPr lang="en-US" dirty="0" smtClean="0"/>
               <a:t>Demo Details	</a:t>
             </a:r>
             <a:endParaRPr lang="en-US" dirty="0"/>
@@ -35692,7 +35883,7 @@
           <a:p>
             <a:fld id="{6EA6D8CF-3CDE-4807-BCD2-C9F2B831AAA5}" type="slidenum">
               <a:rPr lang="en-US" smtClean="0"/>
-              <a:t>2</a:t>
+              <a:t>3</a:t>
             </a:fld>
             <a:endParaRPr lang="en-US" dirty="0"/>
           </a:p>
@@ -35702,204 +35893,6 @@
     <p:extLst>
       <p:ext uri="{BB962C8B-B14F-4D97-AF65-F5344CB8AC3E}">
         <p14:creationId xmlns:p14="http://schemas.microsoft.com/office/powerpoint/2010/main" val="3822856544"/>
-      </p:ext>
-    </p:extLst>
-  </p:cSld>
-  <p:clrMapOvr>
-    <a:masterClrMapping/>
-  </p:clrMapOvr>
-</p:sld>
-</file>
-
-<file path=ppt/slides/slide3.xml><?xml version="1.0" encoding="utf-8"?>
-<p:sld xmlns:a="http://schemas.openxmlformats.org/drawingml/2006/main" xmlns:r="http://schemas.openxmlformats.org/officeDocument/2006/relationships" xmlns:p="http://schemas.openxmlformats.org/presentationml/2006/main">
-  <p:cSld>
-    <p:spTree>
-      <p:nvGrpSpPr>
-        <p:cNvPr id="1" name=""/>
-        <p:cNvGrpSpPr/>
-        <p:nvPr/>
-      </p:nvGrpSpPr>
-      <p:grpSpPr>
-        <a:xfrm>
-          <a:off x="0" y="0"/>
-          <a:ext cx="0" cy="0"/>
-          <a:chOff x="0" y="0"/>
-          <a:chExt cx="0" cy="0"/>
-        </a:xfrm>
-      </p:grpSpPr>
-      <p:sp>
-        <p:nvSpPr>
-          <p:cNvPr id="2" name="Title 1"/>
-          <p:cNvSpPr>
-            <a:spLocks noGrp="1"/>
-          </p:cNvSpPr>
-          <p:nvPr>
-            <p:ph type="title"/>
-          </p:nvPr>
-        </p:nvSpPr>
-        <p:spPr/>
-        <p:txBody>
-          <a:bodyPr/>
-          <a:lstStyle/>
-          <a:p>
-            <a:r>
-              <a:rPr lang="en-US" dirty="0" smtClean="0"/>
-              <a:t>Scenarios</a:t>
-            </a:r>
-            <a:endParaRPr lang="en-US" dirty="0"/>
-          </a:p>
-        </p:txBody>
-      </p:sp>
-      <p:sp>
-        <p:nvSpPr>
-          <p:cNvPr id="3" name="Content Placeholder 2"/>
-          <p:cNvSpPr>
-            <a:spLocks noGrp="1"/>
-          </p:cNvSpPr>
-          <p:nvPr>
-            <p:ph idx="1"/>
-          </p:nvPr>
-        </p:nvSpPr>
-        <p:spPr/>
-        <p:txBody>
-          <a:bodyPr/>
-          <a:lstStyle/>
-          <a:p>
-            <a:r>
-              <a:rPr lang="en-US" dirty="0" smtClean="0"/>
-              <a:t>Current Scenarios</a:t>
-            </a:r>
-          </a:p>
-          <a:p>
-            <a:pPr lvl="1"/>
-            <a:r>
-              <a:rPr lang="en-US" dirty="0"/>
-              <a:t>Create </a:t>
-            </a:r>
-            <a:r>
-              <a:rPr lang="en-US" dirty="0" smtClean="0"/>
-              <a:t>an Ubuntu Server </a:t>
-            </a:r>
-            <a:r>
-              <a:rPr lang="en-US" dirty="0"/>
-              <a:t>on vCloud Air using the Chef vCloud Air Knife </a:t>
-            </a:r>
-            <a:r>
-              <a:rPr lang="en-US" dirty="0" smtClean="0"/>
-              <a:t>plugin.</a:t>
-            </a:r>
-          </a:p>
-          <a:p>
-            <a:pPr lvl="1"/>
-            <a:r>
-              <a:rPr lang="en-US" dirty="0"/>
-              <a:t>Create a Photon Server on vCloud Air using vCloud Air CLI</a:t>
-            </a:r>
-            <a:endParaRPr lang="en-US" dirty="0" smtClean="0"/>
-          </a:p>
-          <a:p>
-            <a:pPr lvl="1"/>
-            <a:r>
-              <a:rPr lang="en-US" dirty="0"/>
-              <a:t>Deploy a D</a:t>
-            </a:r>
-            <a:r>
-              <a:rPr lang="en-US" dirty="0" smtClean="0"/>
-              <a:t>ocker </a:t>
-            </a:r>
-            <a:r>
-              <a:rPr lang="en-US" dirty="0"/>
-              <a:t>container on a Photon </a:t>
-            </a:r>
-            <a:r>
-              <a:rPr lang="en-US" dirty="0" smtClean="0"/>
-              <a:t>Server</a:t>
-            </a:r>
-          </a:p>
-          <a:p>
-            <a:pPr lvl="1"/>
-            <a:r>
-              <a:rPr lang="en-US" dirty="0"/>
-              <a:t>Use chef to configure a Server as a standard Web </a:t>
-            </a:r>
-            <a:r>
-              <a:rPr lang="en-US" dirty="0" smtClean="0"/>
-              <a:t>Server</a:t>
-            </a:r>
-          </a:p>
-          <a:p>
-            <a:pPr lvl="1"/>
-            <a:r>
-              <a:rPr lang="en-US" dirty="0" smtClean="0"/>
-              <a:t>Continuous </a:t>
-            </a:r>
-            <a:r>
-              <a:rPr lang="en-US" dirty="0"/>
-              <a:t>Integration of </a:t>
-            </a:r>
-            <a:r>
-              <a:rPr lang="en-US" dirty="0" smtClean="0"/>
-              <a:t>a Spring Boot </a:t>
-            </a:r>
-            <a:r>
-              <a:rPr lang="en-US" dirty="0"/>
-              <a:t>Project</a:t>
-            </a:r>
-            <a:endParaRPr lang="en-US" dirty="0"/>
-          </a:p>
-        </p:txBody>
-      </p:sp>
-      <p:sp>
-        <p:nvSpPr>
-          <p:cNvPr id="4" name="Footer Placeholder 3"/>
-          <p:cNvSpPr>
-            <a:spLocks noGrp="1"/>
-          </p:cNvSpPr>
-          <p:nvPr>
-            <p:ph type="ftr" sz="quarter" idx="11"/>
-          </p:nvPr>
-        </p:nvSpPr>
-        <p:spPr/>
-        <p:txBody>
-          <a:bodyPr/>
-          <a:lstStyle/>
-          <a:p>
-            <a:r>
-              <a:rPr lang="en-US" dirty="0" smtClean="0"/>
-              <a:t>CONFIDENTIAL</a:t>
-            </a:r>
-            <a:endParaRPr lang="en-US" dirty="0"/>
-          </a:p>
-        </p:txBody>
-      </p:sp>
-      <p:sp>
-        <p:nvSpPr>
-          <p:cNvPr id="5" name="Slide Number Placeholder 4"/>
-          <p:cNvSpPr>
-            <a:spLocks noGrp="1"/>
-          </p:cNvSpPr>
-          <p:nvPr>
-            <p:ph type="sldNum" sz="quarter" idx="12"/>
-          </p:nvPr>
-        </p:nvSpPr>
-        <p:spPr/>
-        <p:txBody>
-          <a:bodyPr/>
-          <a:lstStyle/>
-          <a:p>
-            <a:fld id="{6EA6D8CF-3CDE-4807-BCD2-C9F2B831AAA5}" type="slidenum">
-              <a:rPr lang="en-US" smtClean="0"/>
-              <a:t>3</a:t>
-            </a:fld>
-            <a:endParaRPr lang="en-US" dirty="0"/>
-          </a:p>
-        </p:txBody>
-      </p:sp>
-    </p:spTree>
-    <p:extLst>
-      <p:ext uri="{BB962C8B-B14F-4D97-AF65-F5344CB8AC3E}">
-        <p14:creationId xmlns:p14="http://schemas.microsoft.com/office/powerpoint/2010/main" val="1915387472"/>
       </p:ext>
     </p:extLst>
   </p:cSld>
@@ -35984,18 +35977,17 @@
           <a:p>
             <a:r>
               <a:rPr lang="en-US" dirty="0" smtClean="0"/>
-              <a:t>Expand Ansible and Artifactory </a:t>
+              <a:t>Expand Ansible and Artifactory scenarios.</a:t>
             </a:r>
-            <a:r>
-              <a:rPr lang="en-US" smtClean="0"/>
-              <a:t>scenarios.</a:t>
-            </a:r>
-            <a:endParaRPr lang="en-US" dirty="0" smtClean="0"/>
           </a:p>
           <a:p>
             <a:r>
               <a:rPr lang="en-US" dirty="0"/>
-              <a:t>Looking for SE volunteers to participate in making the demo even better.</a:t>
+              <a:t>Looking for SE volunteers to participate in making the demo even better</a:t>
+            </a:r>
+            <a:r>
+              <a:rPr lang="en-US" dirty="0" smtClean="0"/>
+              <a:t>.</a:t>
             </a:r>
           </a:p>
           <a:p>

</xml_diff>